<commit_message>
ISIS-137: fixing regression (hopefully) with authenticator
git-svn-id: https://svn.apache.org/repos/asf/incubator/isis/trunk@1208324 13f79535-47bb-0310-9956-ffa450edef68
</commit_message>
<xml_diff>
--- a/framework/src/site/resources/images/homepage/IsisUseCases.pptx
+++ b/framework/src/site/resources/images/homepage/IsisUseCases.pptx
@@ -288,7 +288,7 @@
           <a:p>
             <a:fld id="{977AE994-924F-47E8-B426-17AAE7EDBE87}" type="datetimeFigureOut">
               <a:rPr lang="en-GB" smtClean="0"/>
-              <a:t>21/11/2011</a:t>
+              <a:t>29/11/2011</a:t>
             </a:fld>
             <a:endParaRPr lang="en-GB"/>
           </a:p>
@@ -458,7 +458,7 @@
           <a:p>
             <a:fld id="{977AE994-924F-47E8-B426-17AAE7EDBE87}" type="datetimeFigureOut">
               <a:rPr lang="en-GB" smtClean="0"/>
-              <a:t>21/11/2011</a:t>
+              <a:t>29/11/2011</a:t>
             </a:fld>
             <a:endParaRPr lang="en-GB"/>
           </a:p>
@@ -638,7 +638,7 @@
           <a:p>
             <a:fld id="{977AE994-924F-47E8-B426-17AAE7EDBE87}" type="datetimeFigureOut">
               <a:rPr lang="en-GB" smtClean="0"/>
-              <a:t>21/11/2011</a:t>
+              <a:t>29/11/2011</a:t>
             </a:fld>
             <a:endParaRPr lang="en-GB"/>
           </a:p>
@@ -808,7 +808,7 @@
           <a:p>
             <a:fld id="{977AE994-924F-47E8-B426-17AAE7EDBE87}" type="datetimeFigureOut">
               <a:rPr lang="en-GB" smtClean="0"/>
-              <a:t>21/11/2011</a:t>
+              <a:t>29/11/2011</a:t>
             </a:fld>
             <a:endParaRPr lang="en-GB"/>
           </a:p>
@@ -1054,7 +1054,7 @@
           <a:p>
             <a:fld id="{977AE994-924F-47E8-B426-17AAE7EDBE87}" type="datetimeFigureOut">
               <a:rPr lang="en-GB" smtClean="0"/>
-              <a:t>21/11/2011</a:t>
+              <a:t>29/11/2011</a:t>
             </a:fld>
             <a:endParaRPr lang="en-GB"/>
           </a:p>
@@ -1342,7 +1342,7 @@
           <a:p>
             <a:fld id="{977AE994-924F-47E8-B426-17AAE7EDBE87}" type="datetimeFigureOut">
               <a:rPr lang="en-GB" smtClean="0"/>
-              <a:t>21/11/2011</a:t>
+              <a:t>29/11/2011</a:t>
             </a:fld>
             <a:endParaRPr lang="en-GB"/>
           </a:p>
@@ -1764,7 +1764,7 @@
           <a:p>
             <a:fld id="{977AE994-924F-47E8-B426-17AAE7EDBE87}" type="datetimeFigureOut">
               <a:rPr lang="en-GB" smtClean="0"/>
-              <a:t>21/11/2011</a:t>
+              <a:t>29/11/2011</a:t>
             </a:fld>
             <a:endParaRPr lang="en-GB"/>
           </a:p>
@@ -1882,7 +1882,7 @@
           <a:p>
             <a:fld id="{977AE994-924F-47E8-B426-17AAE7EDBE87}" type="datetimeFigureOut">
               <a:rPr lang="en-GB" smtClean="0"/>
-              <a:t>21/11/2011</a:t>
+              <a:t>29/11/2011</a:t>
             </a:fld>
             <a:endParaRPr lang="en-GB"/>
           </a:p>
@@ -1977,7 +1977,7 @@
           <a:p>
             <a:fld id="{977AE994-924F-47E8-B426-17AAE7EDBE87}" type="datetimeFigureOut">
               <a:rPr lang="en-GB" smtClean="0"/>
-              <a:t>21/11/2011</a:t>
+              <a:t>29/11/2011</a:t>
             </a:fld>
             <a:endParaRPr lang="en-GB"/>
           </a:p>
@@ -2254,7 +2254,7 @@
           <a:p>
             <a:fld id="{977AE994-924F-47E8-B426-17AAE7EDBE87}" type="datetimeFigureOut">
               <a:rPr lang="en-GB" smtClean="0"/>
-              <a:t>21/11/2011</a:t>
+              <a:t>29/11/2011</a:t>
             </a:fld>
             <a:endParaRPr lang="en-GB"/>
           </a:p>
@@ -2507,7 +2507,7 @@
           <a:p>
             <a:fld id="{977AE994-924F-47E8-B426-17AAE7EDBE87}" type="datetimeFigureOut">
               <a:rPr lang="en-GB" smtClean="0"/>
-              <a:t>21/11/2011</a:t>
+              <a:t>29/11/2011</a:t>
             </a:fld>
             <a:endParaRPr lang="en-GB"/>
           </a:p>
@@ -2720,7 +2720,7 @@
           <a:p>
             <a:fld id="{977AE994-924F-47E8-B426-17AAE7EDBE87}" type="datetimeFigureOut">
               <a:rPr lang="en-GB" smtClean="0"/>
-              <a:t>21/11/2011</a:t>
+              <a:t>29/11/2011</a:t>
             </a:fld>
             <a:endParaRPr lang="en-GB"/>
           </a:p>
@@ -3095,272 +3095,276 @@
           <a:chExt cx="0" cy="0"/>
         </a:xfrm>
       </p:grpSpPr>
+      <p:sp>
+        <p:nvSpPr>
+          <p:cNvPr id="4" name="Rounded Rectangle 3"/>
+          <p:cNvSpPr/>
+          <p:nvPr/>
+        </p:nvSpPr>
+        <p:spPr>
+          <a:xfrm>
+            <a:off x="35496" y="1016732"/>
+            <a:ext cx="1259532" cy="720081"/>
+          </a:xfrm>
+          <a:prstGeom prst="roundRect">
+            <a:avLst/>
+          </a:prstGeom>
+          <a:ln>
+            <a:noFill/>
+          </a:ln>
+        </p:spPr>
+        <p:style>
+          <a:lnRef idx="2">
+            <a:schemeClr val="accent3">
+              <a:shade val="50000"/>
+            </a:schemeClr>
+          </a:lnRef>
+          <a:fillRef idx="1">
+            <a:schemeClr val="accent3"/>
+          </a:fillRef>
+          <a:effectRef idx="0">
+            <a:schemeClr val="accent3"/>
+          </a:effectRef>
+          <a:fontRef idx="minor">
+            <a:schemeClr val="lt1"/>
+          </a:fontRef>
+        </p:style>
+        <p:txBody>
+          <a:bodyPr lIns="18000" tIns="18000" rIns="18000" bIns="18000" rtlCol="0" anchor="ctr"/>
+          <a:lstStyle/>
+          <a:p>
+            <a:pPr algn="ctr"/>
+            <a:r>
+              <a:rPr lang="en-GB" sz="1100" dirty="0" smtClean="0"/>
+              <a:t>prototype</a:t>
+            </a:r>
+            <a:r>
+              <a:rPr lang="en-GB" sz="1100" dirty="0" smtClean="0"/>
+              <a:t/>
+            </a:r>
+            <a:br>
+              <a:rPr lang="en-GB" sz="1100" dirty="0" smtClean="0"/>
+            </a:br>
+            <a:r>
+              <a:rPr lang="en-GB" sz="1100" dirty="0" err="1" smtClean="0"/>
+              <a:t>pojo</a:t>
+            </a:r>
+            <a:r>
+              <a:rPr lang="en-GB" sz="1100" dirty="0"/>
+              <a:t/>
+            </a:r>
+            <a:br>
+              <a:rPr lang="en-GB" sz="1100" dirty="0"/>
+            </a:br>
+            <a:r>
+              <a:rPr lang="en-GB" sz="1100" dirty="0" smtClean="0"/>
+              <a:t>domain model</a:t>
+            </a:r>
+            <a:endParaRPr lang="en-GB" sz="1200" dirty="0"/>
+          </a:p>
+        </p:txBody>
+      </p:sp>
+      <p:sp>
+        <p:nvSpPr>
+          <p:cNvPr id="5" name="Rounded Rectangle 4"/>
+          <p:cNvSpPr/>
+          <p:nvPr/>
+        </p:nvSpPr>
+        <p:spPr>
+          <a:xfrm>
+            <a:off x="4175348" y="44624"/>
+            <a:ext cx="1259532" cy="720081"/>
+          </a:xfrm>
+          <a:prstGeom prst="roundRect">
+            <a:avLst/>
+          </a:prstGeom>
+          <a:ln>
+            <a:noFill/>
+          </a:ln>
+        </p:spPr>
+        <p:style>
+          <a:lnRef idx="2">
+            <a:schemeClr val="accent6">
+              <a:shade val="50000"/>
+            </a:schemeClr>
+          </a:lnRef>
+          <a:fillRef idx="1">
+            <a:schemeClr val="accent6"/>
+          </a:fillRef>
+          <a:effectRef idx="0">
+            <a:schemeClr val="accent6"/>
+          </a:effectRef>
+          <a:fontRef idx="minor">
+            <a:schemeClr val="lt1"/>
+          </a:fontRef>
+        </p:style>
+        <p:txBody>
+          <a:bodyPr lIns="18000" tIns="18000" rIns="18000" bIns="18000" rtlCol="0" anchor="ctr"/>
+          <a:lstStyle/>
+          <a:p>
+            <a:pPr algn="ctr"/>
+            <a:r>
+              <a:rPr lang="en-GB" sz="1100" dirty="0" smtClean="0"/>
+              <a:t>deploy as the</a:t>
+            </a:r>
+            <a:br>
+              <a:rPr lang="en-GB" sz="1100" dirty="0" smtClean="0"/>
+            </a:br>
+            <a:r>
+              <a:rPr lang="en-GB" sz="1100" dirty="0" smtClean="0"/>
+              <a:t>domain model</a:t>
+            </a:r>
+            <a:br>
+              <a:rPr lang="en-GB" sz="1100" dirty="0" smtClean="0"/>
+            </a:br>
+            <a:r>
+              <a:rPr lang="en-GB" sz="1100" dirty="0" smtClean="0"/>
+              <a:t>in your own app</a:t>
+            </a:r>
+            <a:endParaRPr lang="en-GB" sz="1100" dirty="0"/>
+          </a:p>
+        </p:txBody>
+      </p:sp>
+      <p:sp>
+        <p:nvSpPr>
+          <p:cNvPr id="6" name="Rounded Rectangle 5"/>
+          <p:cNvSpPr/>
+          <p:nvPr/>
+        </p:nvSpPr>
+        <p:spPr>
+          <a:xfrm>
+            <a:off x="4175348" y="1025653"/>
+            <a:ext cx="1259532" cy="720081"/>
+          </a:xfrm>
+          <a:prstGeom prst="roundRect">
+            <a:avLst/>
+          </a:prstGeom>
+          <a:ln>
+            <a:noFill/>
+          </a:ln>
+        </p:spPr>
+        <p:style>
+          <a:lnRef idx="2">
+            <a:schemeClr val="accent2">
+              <a:shade val="50000"/>
+            </a:schemeClr>
+          </a:lnRef>
+          <a:fillRef idx="1">
+            <a:schemeClr val="accent2"/>
+          </a:fillRef>
+          <a:effectRef idx="0">
+            <a:schemeClr val="accent2"/>
+          </a:effectRef>
+          <a:fontRef idx="minor">
+            <a:schemeClr val="lt1"/>
+          </a:fontRef>
+        </p:style>
+        <p:txBody>
+          <a:bodyPr lIns="18000" tIns="18000" rIns="18000" bIns="18000" rtlCol="0" anchor="ctr"/>
+          <a:lstStyle/>
+          <a:p>
+            <a:pPr algn="ctr"/>
+            <a:r>
+              <a:rPr lang="en-GB" sz="1100" dirty="0" smtClean="0"/>
+              <a:t>deploy as an</a:t>
+            </a:r>
+            <a:br>
+              <a:rPr lang="en-GB" sz="1100" dirty="0" smtClean="0"/>
+            </a:br>
+            <a:r>
+              <a:rPr lang="en-GB" sz="1100" dirty="0" smtClean="0"/>
+              <a:t>auto-generated</a:t>
+            </a:r>
+            <a:br>
+              <a:rPr lang="en-GB" sz="1100" dirty="0" smtClean="0"/>
+            </a:br>
+            <a:r>
+              <a:rPr lang="en-GB" sz="1100" dirty="0" err="1" smtClean="0"/>
+              <a:t>RESTful</a:t>
+            </a:r>
+            <a:r>
+              <a:rPr lang="en-GB" sz="1100" dirty="0" smtClean="0"/>
+              <a:t> web service</a:t>
+            </a:r>
+            <a:endParaRPr lang="en-GB" sz="1100" dirty="0"/>
+          </a:p>
+        </p:txBody>
+      </p:sp>
+      <p:sp>
+        <p:nvSpPr>
+          <p:cNvPr id="7" name="Rounded Rectangle 6"/>
+          <p:cNvSpPr/>
+          <p:nvPr/>
+        </p:nvSpPr>
+        <p:spPr>
+          <a:xfrm>
+            <a:off x="4175348" y="1988839"/>
+            <a:ext cx="1259532" cy="720081"/>
+          </a:xfrm>
+          <a:prstGeom prst="roundRect">
+            <a:avLst/>
+          </a:prstGeom>
+          <a:ln>
+            <a:noFill/>
+          </a:ln>
+        </p:spPr>
+        <p:style>
+          <a:lnRef idx="2">
+            <a:schemeClr val="accent1">
+              <a:shade val="50000"/>
+            </a:schemeClr>
+          </a:lnRef>
+          <a:fillRef idx="1">
+            <a:schemeClr val="accent1"/>
+          </a:fillRef>
+          <a:effectRef idx="0">
+            <a:schemeClr val="accent1"/>
+          </a:effectRef>
+          <a:fontRef idx="minor">
+            <a:schemeClr val="lt1"/>
+          </a:fontRef>
+        </p:style>
+        <p:txBody>
+          <a:bodyPr lIns="18000" tIns="18000" rIns="18000" bIns="18000" rtlCol="0" anchor="ctr"/>
+          <a:lstStyle/>
+          <a:p>
+            <a:pPr algn="ctr"/>
+            <a:r>
+              <a:rPr lang="en-GB" sz="1100" dirty="0" smtClean="0"/>
+              <a:t>deploy as a</a:t>
+            </a:r>
+          </a:p>
+          <a:p>
+            <a:pPr algn="ctr"/>
+            <a:r>
+              <a:rPr lang="en-GB" sz="1100" dirty="0" smtClean="0"/>
+              <a:t>auto-generated</a:t>
+            </a:r>
+            <a:br>
+              <a:rPr lang="en-GB" sz="1100" dirty="0" smtClean="0"/>
+            </a:br>
+            <a:r>
+              <a:rPr lang="en-GB" sz="1100" dirty="0" err="1" smtClean="0"/>
+              <a:t>webapp</a:t>
+            </a:r>
+            <a:endParaRPr lang="en-GB" sz="1000" dirty="0"/>
+          </a:p>
+        </p:txBody>
+      </p:sp>
       <p:grpSp>
         <p:nvGrpSpPr>
-          <p:cNvPr id="2" name="Group 1"/>
+          <p:cNvPr id="20" name="Group 19"/>
           <p:cNvGrpSpPr/>
           <p:nvPr/>
         </p:nvGrpSpPr>
         <p:grpSpPr>
           <a:xfrm>
-            <a:off x="35496" y="44624"/>
-            <a:ext cx="4032448" cy="2160240"/>
-            <a:chOff x="35496" y="44624"/>
-            <a:chExt cx="3024336" cy="1656184"/>
+            <a:off x="3527276" y="251122"/>
+            <a:ext cx="566012" cy="2251300"/>
+            <a:chOff x="4726068" y="971202"/>
+            <a:chExt cx="566012" cy="2251300"/>
           </a:xfrm>
         </p:grpSpPr>
-        <p:sp>
-          <p:nvSpPr>
-            <p:cNvPr id="4" name="Rounded Rectangle 3"/>
-            <p:cNvSpPr/>
-            <p:nvPr/>
-          </p:nvSpPr>
-          <p:spPr>
-            <a:xfrm>
-              <a:off x="1084835" y="44624"/>
-              <a:ext cx="944649" cy="552062"/>
-            </a:xfrm>
-            <a:prstGeom prst="roundRect">
-              <a:avLst/>
-            </a:prstGeom>
-            <a:ln>
-              <a:noFill/>
-            </a:ln>
-          </p:spPr>
-          <p:style>
-            <a:lnRef idx="2">
-              <a:schemeClr val="accent3">
-                <a:shade val="50000"/>
-              </a:schemeClr>
-            </a:lnRef>
-            <a:fillRef idx="1">
-              <a:schemeClr val="accent3"/>
-            </a:fillRef>
-            <a:effectRef idx="0">
-              <a:schemeClr val="accent3"/>
-            </a:effectRef>
-            <a:fontRef idx="minor">
-              <a:schemeClr val="lt1"/>
-            </a:fontRef>
-          </p:style>
-          <p:txBody>
-            <a:bodyPr lIns="18000" tIns="18000" rIns="18000" bIns="18000" rtlCol="0" anchor="ctr"/>
-            <a:lstStyle/>
-            <a:p>
-              <a:pPr algn="ctr"/>
-              <a:r>
-                <a:rPr lang="en-GB" sz="1100" dirty="0" smtClean="0"/>
-                <a:t>develop</a:t>
-              </a:r>
-              <a:br>
-                <a:rPr lang="en-GB" sz="1100" dirty="0" smtClean="0"/>
-              </a:br>
-              <a:r>
-                <a:rPr lang="en-GB" sz="1100" dirty="0" err="1" smtClean="0"/>
-                <a:t>pojo</a:t>
-              </a:r>
-              <a:r>
-                <a:rPr lang="en-GB" sz="1100" dirty="0"/>
-                <a:t/>
-              </a:r>
-              <a:br>
-                <a:rPr lang="en-GB" sz="1100" dirty="0"/>
-              </a:br>
-              <a:r>
-                <a:rPr lang="en-GB" sz="1100" dirty="0" smtClean="0"/>
-                <a:t>domain model</a:t>
-              </a:r>
-              <a:endParaRPr lang="en-GB" sz="1200" dirty="0"/>
-            </a:p>
-          </p:txBody>
-        </p:sp>
-        <p:sp>
-          <p:nvSpPr>
-            <p:cNvPr id="5" name="Rounded Rectangle 4"/>
-            <p:cNvSpPr/>
-            <p:nvPr/>
-          </p:nvSpPr>
-          <p:spPr>
-            <a:xfrm>
-              <a:off x="35496" y="1148746"/>
-              <a:ext cx="944649" cy="552062"/>
-            </a:xfrm>
-            <a:prstGeom prst="roundRect">
-              <a:avLst/>
-            </a:prstGeom>
-            <a:ln>
-              <a:noFill/>
-            </a:ln>
-          </p:spPr>
-          <p:style>
-            <a:lnRef idx="2">
-              <a:schemeClr val="accent6">
-                <a:shade val="50000"/>
-              </a:schemeClr>
-            </a:lnRef>
-            <a:fillRef idx="1">
-              <a:schemeClr val="accent6"/>
-            </a:fillRef>
-            <a:effectRef idx="0">
-              <a:schemeClr val="accent6"/>
-            </a:effectRef>
-            <a:fontRef idx="minor">
-              <a:schemeClr val="lt1"/>
-            </a:fontRef>
-          </p:style>
-          <p:txBody>
-            <a:bodyPr lIns="18000" tIns="18000" rIns="18000" bIns="18000" rtlCol="0" anchor="ctr"/>
-            <a:lstStyle/>
-            <a:p>
-              <a:pPr algn="ctr"/>
-              <a:r>
-                <a:rPr lang="en-GB" sz="1100" dirty="0" smtClean="0"/>
-                <a:t>deploy as the</a:t>
-              </a:r>
-              <a:br>
-                <a:rPr lang="en-GB" sz="1100" dirty="0" smtClean="0"/>
-              </a:br>
-              <a:r>
-                <a:rPr lang="en-GB" sz="1100" dirty="0" smtClean="0"/>
-                <a:t>domain model</a:t>
-              </a:r>
-              <a:br>
-                <a:rPr lang="en-GB" sz="1100" dirty="0" smtClean="0"/>
-              </a:br>
-              <a:r>
-                <a:rPr lang="en-GB" sz="1100" dirty="0" smtClean="0"/>
-                <a:t>in your own app</a:t>
-              </a:r>
-              <a:endParaRPr lang="en-GB" sz="1100" dirty="0"/>
-            </a:p>
-          </p:txBody>
-        </p:sp>
-        <p:sp>
-          <p:nvSpPr>
-            <p:cNvPr id="6" name="Rounded Rectangle 5"/>
-            <p:cNvSpPr/>
-            <p:nvPr/>
-          </p:nvSpPr>
-          <p:spPr>
-            <a:xfrm>
-              <a:off x="1084835" y="1148746"/>
-              <a:ext cx="944649" cy="552062"/>
-            </a:xfrm>
-            <a:prstGeom prst="roundRect">
-              <a:avLst/>
-            </a:prstGeom>
-            <a:ln>
-              <a:noFill/>
-            </a:ln>
-          </p:spPr>
-          <p:style>
-            <a:lnRef idx="2">
-              <a:schemeClr val="accent2">
-                <a:shade val="50000"/>
-              </a:schemeClr>
-            </a:lnRef>
-            <a:fillRef idx="1">
-              <a:schemeClr val="accent2"/>
-            </a:fillRef>
-            <a:effectRef idx="0">
-              <a:schemeClr val="accent2"/>
-            </a:effectRef>
-            <a:fontRef idx="minor">
-              <a:schemeClr val="lt1"/>
-            </a:fontRef>
-          </p:style>
-          <p:txBody>
-            <a:bodyPr lIns="18000" tIns="18000" rIns="18000" bIns="18000" rtlCol="0" anchor="ctr"/>
-            <a:lstStyle/>
-            <a:p>
-              <a:pPr algn="ctr"/>
-              <a:r>
-                <a:rPr lang="en-GB" sz="1100" dirty="0" smtClean="0"/>
-                <a:t>deploy as an</a:t>
-              </a:r>
-              <a:br>
-                <a:rPr lang="en-GB" sz="1100" dirty="0" smtClean="0"/>
-              </a:br>
-              <a:r>
-                <a:rPr lang="en-GB" sz="1100" dirty="0" smtClean="0"/>
-                <a:t>auto-generated</a:t>
-              </a:r>
-              <a:br>
-                <a:rPr lang="en-GB" sz="1100" dirty="0" smtClean="0"/>
-              </a:br>
-              <a:r>
-                <a:rPr lang="en-GB" sz="1100" dirty="0" err="1" smtClean="0"/>
-                <a:t>RESTful</a:t>
-              </a:r>
-              <a:r>
-                <a:rPr lang="en-GB" sz="1100" dirty="0" smtClean="0"/>
-                <a:t> web service</a:t>
-              </a:r>
-              <a:endParaRPr lang="en-GB" sz="1100" dirty="0"/>
-            </a:p>
-          </p:txBody>
-        </p:sp>
-        <p:sp>
-          <p:nvSpPr>
-            <p:cNvPr id="7" name="Rounded Rectangle 6"/>
-            <p:cNvSpPr/>
-            <p:nvPr/>
-          </p:nvSpPr>
-          <p:spPr>
-            <a:xfrm>
-              <a:off x="2115183" y="1148746"/>
-              <a:ext cx="944649" cy="552062"/>
-            </a:xfrm>
-            <a:prstGeom prst="roundRect">
-              <a:avLst/>
-            </a:prstGeom>
-            <a:ln>
-              <a:noFill/>
-            </a:ln>
-          </p:spPr>
-          <p:style>
-            <a:lnRef idx="2">
-              <a:schemeClr val="accent1">
-                <a:shade val="50000"/>
-              </a:schemeClr>
-            </a:lnRef>
-            <a:fillRef idx="1">
-              <a:schemeClr val="accent1"/>
-            </a:fillRef>
-            <a:effectRef idx="0">
-              <a:schemeClr val="accent1"/>
-            </a:effectRef>
-            <a:fontRef idx="minor">
-              <a:schemeClr val="lt1"/>
-            </a:fontRef>
-          </p:style>
-          <p:txBody>
-            <a:bodyPr lIns="18000" tIns="18000" rIns="18000" bIns="18000" rtlCol="0" anchor="ctr"/>
-            <a:lstStyle/>
-            <a:p>
-              <a:pPr algn="ctr"/>
-              <a:r>
-                <a:rPr lang="en-GB" sz="1100" dirty="0" smtClean="0"/>
-                <a:t>deploy as a</a:t>
-              </a:r>
-            </a:p>
-            <a:p>
-              <a:pPr algn="ctr"/>
-              <a:r>
-                <a:rPr lang="en-GB" sz="1100" dirty="0" smtClean="0"/>
-                <a:t>auto-generated</a:t>
-              </a:r>
-              <a:br>
-                <a:rPr lang="en-GB" sz="1100" dirty="0" smtClean="0"/>
-              </a:br>
-              <a:r>
-                <a:rPr lang="en-GB" sz="1100" dirty="0" err="1" smtClean="0"/>
-                <a:t>webapp</a:t>
-              </a:r>
-              <a:endParaRPr lang="en-GB" sz="1000" dirty="0"/>
-            </a:p>
-          </p:txBody>
-        </p:sp>
         <p:sp>
           <p:nvSpPr>
             <p:cNvPr id="8" name="Down Arrow 7"/>
@@ -3368,13 +3372,18 @@
             <p:nvPr/>
           </p:nvSpPr>
           <p:spPr>
-            <a:xfrm>
-              <a:off x="1444355" y="787732"/>
-              <a:ext cx="214737" cy="310534"/>
+            <a:xfrm rot="16200000">
+              <a:off x="4944613" y="1888325"/>
+              <a:ext cx="286316" cy="405044"/>
             </a:xfrm>
             <a:prstGeom prst="downArrow">
               <a:avLst/>
             </a:prstGeom>
+            <a:solidFill>
+              <a:schemeClr val="bg2">
+                <a:lumMod val="75000"/>
+              </a:schemeClr>
+            </a:solidFill>
             <a:ln>
               <a:noFill/>
             </a:ln>
@@ -3411,13 +3420,18 @@
             <p:nvPr/>
           </p:nvSpPr>
           <p:spPr>
-            <a:xfrm>
-              <a:off x="2483304" y="789102"/>
-              <a:ext cx="214737" cy="310534"/>
+            <a:xfrm rot="16200000">
+              <a:off x="4946400" y="911838"/>
+              <a:ext cx="286316" cy="405044"/>
             </a:xfrm>
             <a:prstGeom prst="downArrow">
               <a:avLst/>
             </a:prstGeom>
+            <a:solidFill>
+              <a:schemeClr val="bg2">
+                <a:lumMod val="75000"/>
+              </a:schemeClr>
+            </a:solidFill>
             <a:ln>
               <a:noFill/>
             </a:ln>
@@ -3454,13 +3468,18 @@
             <p:nvPr/>
           </p:nvSpPr>
           <p:spPr>
-            <a:xfrm>
-              <a:off x="397286" y="789102"/>
-              <a:ext cx="214737" cy="310534"/>
+            <a:xfrm rot="16200000">
+              <a:off x="4946400" y="2876822"/>
+              <a:ext cx="286316" cy="405044"/>
             </a:xfrm>
             <a:prstGeom prst="downArrow">
               <a:avLst/>
             </a:prstGeom>
+            <a:solidFill>
+              <a:schemeClr val="bg2">
+                <a:lumMod val="75000"/>
+              </a:schemeClr>
+            </a:solidFill>
             <a:ln>
               <a:noFill/>
             </a:ln>
@@ -3497,9 +3516,9 @@
             <p:nvPr/>
           </p:nvSpPr>
           <p:spPr>
-            <a:xfrm>
-              <a:off x="1501648" y="665693"/>
-              <a:ext cx="1135038" cy="241527"/>
+            <a:xfrm rot="16200000">
+              <a:off x="4323683" y="1445595"/>
+              <a:ext cx="1119806" cy="315035"/>
             </a:xfrm>
             <a:prstGeom prst="corner">
               <a:avLst>
@@ -3507,6 +3526,11 @@
                 <a:gd name="adj2" fmla="val 45071"/>
               </a:avLst>
             </a:prstGeom>
+            <a:solidFill>
+              <a:schemeClr val="bg2">
+                <a:lumMod val="75000"/>
+              </a:schemeClr>
+            </a:solidFill>
             <a:ln>
               <a:noFill/>
             </a:ln>
@@ -3543,9 +3567,9 @@
             <p:nvPr/>
           </p:nvSpPr>
           <p:spPr>
-            <a:xfrm flipH="1">
-              <a:off x="458640" y="665693"/>
-              <a:ext cx="1143156" cy="241527"/>
+            <a:xfrm rot="16200000" flipH="1">
+              <a:off x="4319679" y="2428798"/>
+              <a:ext cx="1127813" cy="315035"/>
             </a:xfrm>
             <a:prstGeom prst="corner">
               <a:avLst>
@@ -3553,6 +3577,11 @@
                 <a:gd name="adj2" fmla="val 42113"/>
               </a:avLst>
             </a:prstGeom>
+            <a:solidFill>
+              <a:schemeClr val="bg2">
+                <a:lumMod val="75000"/>
+              </a:schemeClr>
+            </a:solidFill>
             <a:ln>
               <a:noFill/>
             </a:ln>
@@ -3583,6 +3612,129 @@
           </p:txBody>
         </p:sp>
       </p:grpSp>
+      <p:sp>
+        <p:nvSpPr>
+          <p:cNvPr id="13" name="Rounded Rectangle 12"/>
+          <p:cNvSpPr/>
+          <p:nvPr/>
+        </p:nvSpPr>
+        <p:spPr>
+          <a:xfrm>
+            <a:off x="2123728" y="1016732"/>
+            <a:ext cx="1259532" cy="720081"/>
+          </a:xfrm>
+          <a:prstGeom prst="roundRect">
+            <a:avLst/>
+          </a:prstGeom>
+          <a:solidFill>
+            <a:schemeClr val="accent4"/>
+          </a:solidFill>
+          <a:ln>
+            <a:noFill/>
+          </a:ln>
+        </p:spPr>
+        <p:style>
+          <a:lnRef idx="2">
+            <a:schemeClr val="accent3">
+              <a:shade val="50000"/>
+            </a:schemeClr>
+          </a:lnRef>
+          <a:fillRef idx="1">
+            <a:schemeClr val="accent3"/>
+          </a:fillRef>
+          <a:effectRef idx="0">
+            <a:schemeClr val="accent3"/>
+          </a:effectRef>
+          <a:fontRef idx="minor">
+            <a:schemeClr val="lt1"/>
+          </a:fontRef>
+        </p:style>
+        <p:txBody>
+          <a:bodyPr lIns="18000" tIns="18000" rIns="18000" bIns="18000" rtlCol="0" anchor="ctr"/>
+          <a:lstStyle/>
+          <a:p>
+            <a:pPr algn="ctr"/>
+            <a:r>
+              <a:rPr lang="en-GB" sz="1100" dirty="0" smtClean="0"/>
+              <a:t>specify, </a:t>
+            </a:r>
+            <a:br>
+              <a:rPr lang="en-GB" sz="1100" dirty="0" smtClean="0"/>
+            </a:br>
+            <a:r>
+              <a:rPr lang="en-GB" sz="1100" dirty="0" smtClean="0"/>
+              <a:t>develop</a:t>
+            </a:r>
+            <a:br>
+              <a:rPr lang="en-GB" sz="1100" dirty="0" smtClean="0"/>
+            </a:br>
+            <a:r>
+              <a:rPr lang="en-GB" sz="1100" dirty="0" smtClean="0"/>
+              <a:t>domain model </a:t>
+            </a:r>
+            <a:r>
+              <a:rPr lang="en-GB" sz="1100" dirty="0" smtClean="0"/>
+              <a:t>&amp;</a:t>
+            </a:r>
+            <a:br>
+              <a:rPr lang="en-GB" sz="1100" dirty="0" smtClean="0"/>
+            </a:br>
+            <a:r>
+              <a:rPr lang="en-GB" sz="1100" dirty="0" smtClean="0"/>
+              <a:t>unit test</a:t>
+            </a:r>
+            <a:endParaRPr lang="en-GB" sz="1200" dirty="0"/>
+          </a:p>
+        </p:txBody>
+      </p:sp>
+      <p:sp>
+        <p:nvSpPr>
+          <p:cNvPr id="15" name="Down Arrow 14"/>
+          <p:cNvSpPr/>
+          <p:nvPr/>
+        </p:nvSpPr>
+        <p:spPr>
+          <a:xfrm rot="16200000">
+            <a:off x="1589837" y="1094660"/>
+            <a:ext cx="286316" cy="564226"/>
+          </a:xfrm>
+          <a:prstGeom prst="downArrow">
+            <a:avLst/>
+          </a:prstGeom>
+          <a:solidFill>
+            <a:schemeClr val="bg2">
+              <a:lumMod val="75000"/>
+            </a:schemeClr>
+          </a:solidFill>
+          <a:ln>
+            <a:noFill/>
+          </a:ln>
+        </p:spPr>
+        <p:style>
+          <a:lnRef idx="2">
+            <a:schemeClr val="accent4">
+              <a:shade val="50000"/>
+            </a:schemeClr>
+          </a:lnRef>
+          <a:fillRef idx="1">
+            <a:schemeClr val="accent4"/>
+          </a:fillRef>
+          <a:effectRef idx="0">
+            <a:schemeClr val="accent4"/>
+          </a:effectRef>
+          <a:fontRef idx="minor">
+            <a:schemeClr val="lt1"/>
+          </a:fontRef>
+        </p:style>
+        <p:txBody>
+          <a:bodyPr rtlCol="0" anchor="ctr"/>
+          <a:lstStyle/>
+          <a:p>
+            <a:pPr algn="ctr"/>
+            <a:endParaRPr lang="en-GB" sz="1000"/>
+          </a:p>
+        </p:txBody>
+      </p:sp>
     </p:spTree>
     <p:extLst>
       <p:ext uri="{BB962C8B-B14F-4D97-AF65-F5344CB8AC3E}">

</xml_diff>

<commit_message>
ISIS-107: updates to site docs
git-svn-id: https://svn.apache.org/repos/asf/incubator/isis/trunk@1211237 13f79535-47bb-0310-9956-ffa450edef68
</commit_message>
<xml_diff>
--- a/framework/src/site/resources/images/homepage/IsisUseCases.pptx
+++ b/framework/src/site/resources/images/homepage/IsisUseCases.pptx
@@ -288,7 +288,7 @@
           <a:p>
             <a:fld id="{977AE994-924F-47E8-B426-17AAE7EDBE87}" type="datetimeFigureOut">
               <a:rPr lang="en-GB" smtClean="0"/>
-              <a:t>29/11/2011</a:t>
+              <a:t>06/12/2011</a:t>
             </a:fld>
             <a:endParaRPr lang="en-GB"/>
           </a:p>
@@ -458,7 +458,7 @@
           <a:p>
             <a:fld id="{977AE994-924F-47E8-B426-17AAE7EDBE87}" type="datetimeFigureOut">
               <a:rPr lang="en-GB" smtClean="0"/>
-              <a:t>29/11/2011</a:t>
+              <a:t>06/12/2011</a:t>
             </a:fld>
             <a:endParaRPr lang="en-GB"/>
           </a:p>
@@ -638,7 +638,7 @@
           <a:p>
             <a:fld id="{977AE994-924F-47E8-B426-17AAE7EDBE87}" type="datetimeFigureOut">
               <a:rPr lang="en-GB" smtClean="0"/>
-              <a:t>29/11/2011</a:t>
+              <a:t>06/12/2011</a:t>
             </a:fld>
             <a:endParaRPr lang="en-GB"/>
           </a:p>
@@ -808,7 +808,7 @@
           <a:p>
             <a:fld id="{977AE994-924F-47E8-B426-17AAE7EDBE87}" type="datetimeFigureOut">
               <a:rPr lang="en-GB" smtClean="0"/>
-              <a:t>29/11/2011</a:t>
+              <a:t>06/12/2011</a:t>
             </a:fld>
             <a:endParaRPr lang="en-GB"/>
           </a:p>
@@ -1054,7 +1054,7 @@
           <a:p>
             <a:fld id="{977AE994-924F-47E8-B426-17AAE7EDBE87}" type="datetimeFigureOut">
               <a:rPr lang="en-GB" smtClean="0"/>
-              <a:t>29/11/2011</a:t>
+              <a:t>06/12/2011</a:t>
             </a:fld>
             <a:endParaRPr lang="en-GB"/>
           </a:p>
@@ -1342,7 +1342,7 @@
           <a:p>
             <a:fld id="{977AE994-924F-47E8-B426-17AAE7EDBE87}" type="datetimeFigureOut">
               <a:rPr lang="en-GB" smtClean="0"/>
-              <a:t>29/11/2011</a:t>
+              <a:t>06/12/2011</a:t>
             </a:fld>
             <a:endParaRPr lang="en-GB"/>
           </a:p>
@@ -1764,7 +1764,7 @@
           <a:p>
             <a:fld id="{977AE994-924F-47E8-B426-17AAE7EDBE87}" type="datetimeFigureOut">
               <a:rPr lang="en-GB" smtClean="0"/>
-              <a:t>29/11/2011</a:t>
+              <a:t>06/12/2011</a:t>
             </a:fld>
             <a:endParaRPr lang="en-GB"/>
           </a:p>
@@ -1882,7 +1882,7 @@
           <a:p>
             <a:fld id="{977AE994-924F-47E8-B426-17AAE7EDBE87}" type="datetimeFigureOut">
               <a:rPr lang="en-GB" smtClean="0"/>
-              <a:t>29/11/2011</a:t>
+              <a:t>06/12/2011</a:t>
             </a:fld>
             <a:endParaRPr lang="en-GB"/>
           </a:p>
@@ -1977,7 +1977,7 @@
           <a:p>
             <a:fld id="{977AE994-924F-47E8-B426-17AAE7EDBE87}" type="datetimeFigureOut">
               <a:rPr lang="en-GB" smtClean="0"/>
-              <a:t>29/11/2011</a:t>
+              <a:t>06/12/2011</a:t>
             </a:fld>
             <a:endParaRPr lang="en-GB"/>
           </a:p>
@@ -2254,7 +2254,7 @@
           <a:p>
             <a:fld id="{977AE994-924F-47E8-B426-17AAE7EDBE87}" type="datetimeFigureOut">
               <a:rPr lang="en-GB" smtClean="0"/>
-              <a:t>29/11/2011</a:t>
+              <a:t>06/12/2011</a:t>
             </a:fld>
             <a:endParaRPr lang="en-GB"/>
           </a:p>
@@ -2507,7 +2507,7 @@
           <a:p>
             <a:fld id="{977AE994-924F-47E8-B426-17AAE7EDBE87}" type="datetimeFigureOut">
               <a:rPr lang="en-GB" smtClean="0"/>
-              <a:t>29/11/2011</a:t>
+              <a:t>06/12/2011</a:t>
             </a:fld>
             <a:endParaRPr lang="en-GB"/>
           </a:p>
@@ -2720,7 +2720,7 @@
           <a:p>
             <a:fld id="{977AE994-924F-47E8-B426-17AAE7EDBE87}" type="datetimeFigureOut">
               <a:rPr lang="en-GB" smtClean="0"/>
-              <a:t>29/11/2011</a:t>
+              <a:t>06/12/2011</a:t>
             </a:fld>
             <a:endParaRPr lang="en-GB"/>
           </a:p>
@@ -3103,7 +3103,7 @@
         </p:nvSpPr>
         <p:spPr>
           <a:xfrm>
-            <a:off x="35496" y="1016732"/>
+            <a:off x="230678" y="1016732"/>
             <a:ext cx="1259532" cy="720081"/>
           </a:xfrm>
           <a:prstGeom prst="roundRect">
@@ -3138,10 +3138,6 @@
               <a:rPr lang="en-GB" sz="1100" dirty="0" smtClean="0"/>
               <a:t>prototype</a:t>
             </a:r>
-            <a:r>
-              <a:rPr lang="en-GB" sz="1100" dirty="0" smtClean="0"/>
-              <a:t/>
-            </a:r>
             <a:br>
               <a:rPr lang="en-GB" sz="1100" dirty="0" smtClean="0"/>
             </a:br>
@@ -3172,7 +3168,7 @@
         </p:nvSpPr>
         <p:spPr>
           <a:xfrm>
-            <a:off x="4175348" y="44624"/>
+            <a:off x="4370530" y="44624"/>
             <a:ext cx="1259532" cy="720081"/>
           </a:xfrm>
           <a:prstGeom prst="roundRect">
@@ -3233,7 +3229,7 @@
         </p:nvSpPr>
         <p:spPr>
           <a:xfrm>
-            <a:off x="4175348" y="1025653"/>
+            <a:off x="4370530" y="1025653"/>
             <a:ext cx="1259532" cy="720081"/>
           </a:xfrm>
           <a:prstGeom prst="roundRect">
@@ -3284,7 +3280,11 @@
             </a:r>
             <a:r>
               <a:rPr lang="en-GB" sz="1100" dirty="0" smtClean="0"/>
-              <a:t> web service</a:t>
+              <a:t> web </a:t>
+            </a:r>
+            <a:r>
+              <a:rPr lang="en-GB" sz="1100" dirty="0" smtClean="0"/>
+              <a:t>service</a:t>
             </a:r>
             <a:endParaRPr lang="en-GB" sz="1100" dirty="0"/>
           </a:p>
@@ -3298,7 +3298,7 @@
         </p:nvSpPr>
         <p:spPr>
           <a:xfrm>
-            <a:off x="4175348" y="1988839"/>
+            <a:off x="4370530" y="1988839"/>
             <a:ext cx="1259532" cy="720081"/>
           </a:xfrm>
           <a:prstGeom prst="roundRect">
@@ -3351,267 +3351,252 @@
           </a:p>
         </p:txBody>
       </p:sp>
-      <p:grpSp>
-        <p:nvGrpSpPr>
-          <p:cNvPr id="20" name="Group 19"/>
-          <p:cNvGrpSpPr/>
+      <p:sp>
+        <p:nvSpPr>
+          <p:cNvPr id="8" name="Down Arrow 7"/>
+          <p:cNvSpPr/>
           <p:nvPr/>
-        </p:nvGrpSpPr>
-        <p:grpSpPr>
-          <a:xfrm>
-            <a:off x="3527276" y="251122"/>
-            <a:ext cx="566012" cy="2251300"/>
-            <a:chOff x="4726068" y="971202"/>
-            <a:chExt cx="566012" cy="2251300"/>
+        </p:nvSpPr>
+        <p:spPr>
+          <a:xfrm rot="16200000">
+            <a:off x="3941003" y="1168245"/>
+            <a:ext cx="286316" cy="405044"/>
           </a:xfrm>
-        </p:grpSpPr>
-        <p:sp>
-          <p:nvSpPr>
-            <p:cNvPr id="8" name="Down Arrow 7"/>
-            <p:cNvSpPr/>
-            <p:nvPr/>
-          </p:nvSpPr>
-          <p:spPr>
-            <a:xfrm rot="16200000">
-              <a:off x="4944613" y="1888325"/>
-              <a:ext cx="286316" cy="405044"/>
-            </a:xfrm>
-            <a:prstGeom prst="downArrow">
-              <a:avLst/>
-            </a:prstGeom>
-            <a:solidFill>
-              <a:schemeClr val="bg2">
-                <a:lumMod val="75000"/>
-              </a:schemeClr>
-            </a:solidFill>
-            <a:ln>
-              <a:noFill/>
-            </a:ln>
-          </p:spPr>
-          <p:style>
-            <a:lnRef idx="2">
-              <a:schemeClr val="accent4">
-                <a:shade val="50000"/>
-              </a:schemeClr>
-            </a:lnRef>
-            <a:fillRef idx="1">
-              <a:schemeClr val="accent4"/>
-            </a:fillRef>
-            <a:effectRef idx="0">
-              <a:schemeClr val="accent4"/>
-            </a:effectRef>
-            <a:fontRef idx="minor">
-              <a:schemeClr val="lt1"/>
-            </a:fontRef>
-          </p:style>
-          <p:txBody>
-            <a:bodyPr rtlCol="0" anchor="ctr"/>
-            <a:lstStyle/>
-            <a:p>
-              <a:pPr algn="ctr"/>
-              <a:endParaRPr lang="en-GB" sz="1000"/>
-            </a:p>
-          </p:txBody>
-        </p:sp>
-        <p:sp>
-          <p:nvSpPr>
-            <p:cNvPr id="10" name="Down Arrow 9"/>
-            <p:cNvSpPr/>
-            <p:nvPr/>
-          </p:nvSpPr>
-          <p:spPr>
-            <a:xfrm rot="16200000">
-              <a:off x="4946400" y="911838"/>
-              <a:ext cx="286316" cy="405044"/>
-            </a:xfrm>
-            <a:prstGeom prst="downArrow">
-              <a:avLst/>
-            </a:prstGeom>
-            <a:solidFill>
-              <a:schemeClr val="bg2">
-                <a:lumMod val="75000"/>
-              </a:schemeClr>
-            </a:solidFill>
-            <a:ln>
-              <a:noFill/>
-            </a:ln>
-          </p:spPr>
-          <p:style>
-            <a:lnRef idx="2">
-              <a:schemeClr val="accent4">
-                <a:shade val="50000"/>
-              </a:schemeClr>
-            </a:lnRef>
-            <a:fillRef idx="1">
-              <a:schemeClr val="accent4"/>
-            </a:fillRef>
-            <a:effectRef idx="0">
-              <a:schemeClr val="accent4"/>
-            </a:effectRef>
-            <a:fontRef idx="minor">
-              <a:schemeClr val="lt1"/>
-            </a:fontRef>
-          </p:style>
-          <p:txBody>
-            <a:bodyPr rtlCol="0" anchor="ctr"/>
-            <a:lstStyle/>
-            <a:p>
-              <a:pPr algn="ctr"/>
-              <a:endParaRPr lang="en-GB" sz="1000"/>
-            </a:p>
-          </p:txBody>
-        </p:sp>
-        <p:sp>
-          <p:nvSpPr>
-            <p:cNvPr id="11" name="Down Arrow 10"/>
-            <p:cNvSpPr/>
-            <p:nvPr/>
-          </p:nvSpPr>
-          <p:spPr>
-            <a:xfrm rot="16200000">
-              <a:off x="4946400" y="2876822"/>
-              <a:ext cx="286316" cy="405044"/>
-            </a:xfrm>
-            <a:prstGeom prst="downArrow">
-              <a:avLst/>
-            </a:prstGeom>
-            <a:solidFill>
-              <a:schemeClr val="bg2">
-                <a:lumMod val="75000"/>
-              </a:schemeClr>
-            </a:solidFill>
-            <a:ln>
-              <a:noFill/>
-            </a:ln>
-          </p:spPr>
-          <p:style>
-            <a:lnRef idx="2">
-              <a:schemeClr val="accent4">
-                <a:shade val="50000"/>
-              </a:schemeClr>
-            </a:lnRef>
-            <a:fillRef idx="1">
-              <a:schemeClr val="accent4"/>
-            </a:fillRef>
-            <a:effectRef idx="0">
-              <a:schemeClr val="accent4"/>
-            </a:effectRef>
-            <a:fontRef idx="minor">
-              <a:schemeClr val="lt1"/>
-            </a:fontRef>
-          </p:style>
-          <p:txBody>
-            <a:bodyPr rtlCol="0" anchor="ctr"/>
-            <a:lstStyle/>
-            <a:p>
-              <a:pPr algn="ctr"/>
-              <a:endParaRPr lang="en-GB" sz="1000"/>
-            </a:p>
-          </p:txBody>
-        </p:sp>
-        <p:sp>
-          <p:nvSpPr>
-            <p:cNvPr id="9" name="L-Shape 8"/>
-            <p:cNvSpPr/>
-            <p:nvPr/>
-          </p:nvSpPr>
-          <p:spPr>
-            <a:xfrm rot="16200000">
-              <a:off x="4323683" y="1445595"/>
-              <a:ext cx="1119806" cy="315035"/>
-            </a:xfrm>
-            <a:prstGeom prst="corner">
-              <a:avLst>
-                <a:gd name="adj1" fmla="val 50000"/>
-                <a:gd name="adj2" fmla="val 45071"/>
-              </a:avLst>
-            </a:prstGeom>
-            <a:solidFill>
-              <a:schemeClr val="bg2">
-                <a:lumMod val="75000"/>
-              </a:schemeClr>
-            </a:solidFill>
-            <a:ln>
-              <a:noFill/>
-            </a:ln>
-          </p:spPr>
-          <p:style>
-            <a:lnRef idx="2">
-              <a:schemeClr val="accent4">
-                <a:shade val="50000"/>
-              </a:schemeClr>
-            </a:lnRef>
-            <a:fillRef idx="1">
-              <a:schemeClr val="accent4"/>
-            </a:fillRef>
-            <a:effectRef idx="0">
-              <a:schemeClr val="accent4"/>
-            </a:effectRef>
-            <a:fontRef idx="minor">
-              <a:schemeClr val="lt1"/>
-            </a:fontRef>
-          </p:style>
-          <p:txBody>
-            <a:bodyPr rtlCol="0" anchor="ctr"/>
-            <a:lstStyle/>
-            <a:p>
-              <a:pPr algn="ctr"/>
-              <a:endParaRPr lang="en-GB" sz="1000" dirty="0"/>
-            </a:p>
-          </p:txBody>
-        </p:sp>
-        <p:sp>
-          <p:nvSpPr>
-            <p:cNvPr id="12" name="L-Shape 11"/>
-            <p:cNvSpPr/>
-            <p:nvPr/>
-          </p:nvSpPr>
-          <p:spPr>
-            <a:xfrm rot="16200000" flipH="1">
-              <a:off x="4319679" y="2428798"/>
-              <a:ext cx="1127813" cy="315035"/>
-            </a:xfrm>
-            <a:prstGeom prst="corner">
-              <a:avLst>
-                <a:gd name="adj1" fmla="val 50000"/>
-                <a:gd name="adj2" fmla="val 42113"/>
-              </a:avLst>
-            </a:prstGeom>
-            <a:solidFill>
-              <a:schemeClr val="bg2">
-                <a:lumMod val="75000"/>
-              </a:schemeClr>
-            </a:solidFill>
-            <a:ln>
-              <a:noFill/>
-            </a:ln>
-          </p:spPr>
-          <p:style>
-            <a:lnRef idx="2">
-              <a:schemeClr val="accent4">
-                <a:shade val="50000"/>
-              </a:schemeClr>
-            </a:lnRef>
-            <a:fillRef idx="1">
-              <a:schemeClr val="accent4"/>
-            </a:fillRef>
-            <a:effectRef idx="0">
-              <a:schemeClr val="accent4"/>
-            </a:effectRef>
-            <a:fontRef idx="minor">
-              <a:schemeClr val="lt1"/>
-            </a:fontRef>
-          </p:style>
-          <p:txBody>
-            <a:bodyPr rtlCol="0" anchor="ctr"/>
-            <a:lstStyle/>
-            <a:p>
-              <a:pPr algn="ctr"/>
-              <a:endParaRPr lang="en-GB" sz="1000"/>
-            </a:p>
-          </p:txBody>
-        </p:sp>
-      </p:grpSp>
+          <a:prstGeom prst="downArrow">
+            <a:avLst/>
+          </a:prstGeom>
+          <a:solidFill>
+            <a:schemeClr val="bg2">
+              <a:lumMod val="75000"/>
+            </a:schemeClr>
+          </a:solidFill>
+          <a:ln>
+            <a:noFill/>
+          </a:ln>
+        </p:spPr>
+        <p:style>
+          <a:lnRef idx="2">
+            <a:schemeClr val="accent4">
+              <a:shade val="50000"/>
+            </a:schemeClr>
+          </a:lnRef>
+          <a:fillRef idx="1">
+            <a:schemeClr val="accent4"/>
+          </a:fillRef>
+          <a:effectRef idx="0">
+            <a:schemeClr val="accent4"/>
+          </a:effectRef>
+          <a:fontRef idx="minor">
+            <a:schemeClr val="lt1"/>
+          </a:fontRef>
+        </p:style>
+        <p:txBody>
+          <a:bodyPr rtlCol="0" anchor="ctr"/>
+          <a:lstStyle/>
+          <a:p>
+            <a:pPr algn="ctr"/>
+            <a:endParaRPr lang="en-GB" sz="1000"/>
+          </a:p>
+        </p:txBody>
+      </p:sp>
+      <p:sp>
+        <p:nvSpPr>
+          <p:cNvPr id="10" name="Down Arrow 9"/>
+          <p:cNvSpPr/>
+          <p:nvPr/>
+        </p:nvSpPr>
+        <p:spPr>
+          <a:xfrm rot="16200000">
+            <a:off x="3942790" y="191758"/>
+            <a:ext cx="286316" cy="405044"/>
+          </a:xfrm>
+          <a:prstGeom prst="downArrow">
+            <a:avLst/>
+          </a:prstGeom>
+          <a:solidFill>
+            <a:schemeClr val="bg2">
+              <a:lumMod val="75000"/>
+            </a:schemeClr>
+          </a:solidFill>
+          <a:ln>
+            <a:noFill/>
+          </a:ln>
+        </p:spPr>
+        <p:style>
+          <a:lnRef idx="2">
+            <a:schemeClr val="accent4">
+              <a:shade val="50000"/>
+            </a:schemeClr>
+          </a:lnRef>
+          <a:fillRef idx="1">
+            <a:schemeClr val="accent4"/>
+          </a:fillRef>
+          <a:effectRef idx="0">
+            <a:schemeClr val="accent4"/>
+          </a:effectRef>
+          <a:fontRef idx="minor">
+            <a:schemeClr val="lt1"/>
+          </a:fontRef>
+        </p:style>
+        <p:txBody>
+          <a:bodyPr rtlCol="0" anchor="ctr"/>
+          <a:lstStyle/>
+          <a:p>
+            <a:pPr algn="ctr"/>
+            <a:endParaRPr lang="en-GB" sz="1000"/>
+          </a:p>
+        </p:txBody>
+      </p:sp>
+      <p:sp>
+        <p:nvSpPr>
+          <p:cNvPr id="11" name="Down Arrow 10"/>
+          <p:cNvSpPr/>
+          <p:nvPr/>
+        </p:nvSpPr>
+        <p:spPr>
+          <a:xfrm rot="16200000">
+            <a:off x="3942790" y="2156742"/>
+            <a:ext cx="286316" cy="405044"/>
+          </a:xfrm>
+          <a:prstGeom prst="downArrow">
+            <a:avLst/>
+          </a:prstGeom>
+          <a:solidFill>
+            <a:schemeClr val="bg2">
+              <a:lumMod val="75000"/>
+            </a:schemeClr>
+          </a:solidFill>
+          <a:ln>
+            <a:noFill/>
+          </a:ln>
+        </p:spPr>
+        <p:style>
+          <a:lnRef idx="2">
+            <a:schemeClr val="accent4">
+              <a:shade val="50000"/>
+            </a:schemeClr>
+          </a:lnRef>
+          <a:fillRef idx="1">
+            <a:schemeClr val="accent4"/>
+          </a:fillRef>
+          <a:effectRef idx="0">
+            <a:schemeClr val="accent4"/>
+          </a:effectRef>
+          <a:fontRef idx="minor">
+            <a:schemeClr val="lt1"/>
+          </a:fontRef>
+        </p:style>
+        <p:txBody>
+          <a:bodyPr rtlCol="0" anchor="ctr"/>
+          <a:lstStyle/>
+          <a:p>
+            <a:pPr algn="ctr"/>
+            <a:endParaRPr lang="en-GB" sz="1000"/>
+          </a:p>
+        </p:txBody>
+      </p:sp>
+      <p:sp>
+        <p:nvSpPr>
+          <p:cNvPr id="9" name="L-Shape 8"/>
+          <p:cNvSpPr/>
+          <p:nvPr/>
+        </p:nvSpPr>
+        <p:spPr>
+          <a:xfrm rot="16200000">
+            <a:off x="3320073" y="725515"/>
+            <a:ext cx="1119806" cy="315035"/>
+          </a:xfrm>
+          <a:prstGeom prst="corner">
+            <a:avLst>
+              <a:gd name="adj1" fmla="val 50000"/>
+              <a:gd name="adj2" fmla="val 45071"/>
+            </a:avLst>
+          </a:prstGeom>
+          <a:solidFill>
+            <a:schemeClr val="bg2">
+              <a:lumMod val="75000"/>
+            </a:schemeClr>
+          </a:solidFill>
+          <a:ln>
+            <a:noFill/>
+          </a:ln>
+        </p:spPr>
+        <p:style>
+          <a:lnRef idx="2">
+            <a:schemeClr val="accent4">
+              <a:shade val="50000"/>
+            </a:schemeClr>
+          </a:lnRef>
+          <a:fillRef idx="1">
+            <a:schemeClr val="accent4"/>
+          </a:fillRef>
+          <a:effectRef idx="0">
+            <a:schemeClr val="accent4"/>
+          </a:effectRef>
+          <a:fontRef idx="minor">
+            <a:schemeClr val="lt1"/>
+          </a:fontRef>
+        </p:style>
+        <p:txBody>
+          <a:bodyPr rtlCol="0" anchor="ctr"/>
+          <a:lstStyle/>
+          <a:p>
+            <a:pPr algn="ctr"/>
+            <a:endParaRPr lang="en-GB" sz="1000" dirty="0"/>
+          </a:p>
+        </p:txBody>
+      </p:sp>
+      <p:sp>
+        <p:nvSpPr>
+          <p:cNvPr id="12" name="L-Shape 11"/>
+          <p:cNvSpPr/>
+          <p:nvPr/>
+        </p:nvSpPr>
+        <p:spPr>
+          <a:xfrm rot="16200000" flipH="1">
+            <a:off x="3316069" y="1708718"/>
+            <a:ext cx="1127813" cy="315035"/>
+          </a:xfrm>
+          <a:prstGeom prst="corner">
+            <a:avLst>
+              <a:gd name="adj1" fmla="val 50000"/>
+              <a:gd name="adj2" fmla="val 42113"/>
+            </a:avLst>
+          </a:prstGeom>
+          <a:solidFill>
+            <a:schemeClr val="bg2">
+              <a:lumMod val="75000"/>
+            </a:schemeClr>
+          </a:solidFill>
+          <a:ln>
+            <a:noFill/>
+          </a:ln>
+        </p:spPr>
+        <p:style>
+          <a:lnRef idx="2">
+            <a:schemeClr val="accent4">
+              <a:shade val="50000"/>
+            </a:schemeClr>
+          </a:lnRef>
+          <a:fillRef idx="1">
+            <a:schemeClr val="accent4"/>
+          </a:fillRef>
+          <a:effectRef idx="0">
+            <a:schemeClr val="accent4"/>
+          </a:effectRef>
+          <a:fontRef idx="minor">
+            <a:schemeClr val="lt1"/>
+          </a:fontRef>
+        </p:style>
+        <p:txBody>
+          <a:bodyPr rtlCol="0" anchor="ctr"/>
+          <a:lstStyle/>
+          <a:p>
+            <a:pPr algn="ctr"/>
+            <a:endParaRPr lang="en-GB" sz="1000"/>
+          </a:p>
+        </p:txBody>
+      </p:sp>
       <p:sp>
         <p:nvSpPr>
           <p:cNvPr id="13" name="Rounded Rectangle 12"/>
@@ -3620,7 +3605,7 @@
         </p:nvSpPr>
         <p:spPr>
           <a:xfrm>
-            <a:off x="2123728" y="1016732"/>
+            <a:off x="2318910" y="1016732"/>
             <a:ext cx="1259532" cy="720081"/>
           </a:xfrm>
           <a:prstGeom prst="roundRect">
@@ -3670,11 +3655,7 @@
             </a:br>
             <a:r>
               <a:rPr lang="en-GB" sz="1100" dirty="0" smtClean="0"/>
-              <a:t>domain model </a:t>
-            </a:r>
-            <a:r>
-              <a:rPr lang="en-GB" sz="1100" dirty="0" smtClean="0"/>
-              <a:t>&amp;</a:t>
+              <a:t>domain model &amp;</a:t>
             </a:r>
             <a:br>
               <a:rPr lang="en-GB" sz="1100" dirty="0" smtClean="0"/>
@@ -3695,7 +3676,7 @@
         </p:nvSpPr>
         <p:spPr>
           <a:xfrm rot="16200000">
-            <a:off x="1589837" y="1094660"/>
+            <a:off x="1785019" y="1094660"/>
             <a:ext cx="286316" cy="564226"/>
           </a:xfrm>
           <a:prstGeom prst="downArrow">
@@ -3732,6 +3713,221 @@
           <a:p>
             <a:pPr algn="ctr"/>
             <a:endParaRPr lang="en-GB" sz="1000"/>
+          </a:p>
+        </p:txBody>
+      </p:sp>
+      <p:sp>
+        <p:nvSpPr>
+          <p:cNvPr id="2" name="TextBox 1"/>
+          <p:cNvSpPr txBox="1"/>
+          <p:nvPr/>
+        </p:nvSpPr>
+        <p:spPr>
+          <a:xfrm>
+            <a:off x="5709894" y="1085255"/>
+            <a:ext cx="1704697" cy="615553"/>
+          </a:xfrm>
+          <a:prstGeom prst="rect">
+            <a:avLst/>
+          </a:prstGeom>
+          <a:noFill/>
+        </p:spPr>
+        <p:txBody>
+          <a:bodyPr wrap="none" rtlCol="0">
+            <a:spAutoFit/>
+          </a:bodyPr>
+          <a:lstStyle/>
+          <a:p>
+            <a:r>
+              <a:rPr lang="en-GB" sz="1200" dirty="0" smtClean="0"/>
+              <a:t>with Isis persistence</a:t>
+            </a:r>
+            <a:br>
+              <a:rPr lang="en-GB" sz="1200" dirty="0" smtClean="0"/>
+            </a:br>
+            <a:r>
+              <a:rPr lang="en-GB" sz="900" dirty="0" smtClean="0"/>
+              <a:t>     or</a:t>
+            </a:r>
+            <a:br>
+              <a:rPr lang="en-GB" sz="900" dirty="0" smtClean="0"/>
+            </a:br>
+            <a:r>
+              <a:rPr lang="en-GB" sz="1200" dirty="0" smtClean="0"/>
+              <a:t>with custom persistence</a:t>
+            </a:r>
+          </a:p>
+        </p:txBody>
+      </p:sp>
+      <p:sp>
+        <p:nvSpPr>
+          <p:cNvPr id="17" name="TextBox 16"/>
+          <p:cNvSpPr txBox="1"/>
+          <p:nvPr/>
+        </p:nvSpPr>
+        <p:spPr>
+          <a:xfrm>
+            <a:off x="5703286" y="2040409"/>
+            <a:ext cx="1704697" cy="615553"/>
+          </a:xfrm>
+          <a:prstGeom prst="rect">
+            <a:avLst/>
+          </a:prstGeom>
+          <a:noFill/>
+        </p:spPr>
+        <p:txBody>
+          <a:bodyPr wrap="none" rtlCol="0">
+            <a:spAutoFit/>
+          </a:bodyPr>
+          <a:lstStyle/>
+          <a:p>
+            <a:r>
+              <a:rPr lang="en-GB" sz="1200" dirty="0" smtClean="0"/>
+              <a:t>with Isis persistence</a:t>
+            </a:r>
+            <a:br>
+              <a:rPr lang="en-GB" sz="1200" dirty="0" smtClean="0"/>
+            </a:br>
+            <a:r>
+              <a:rPr lang="en-GB" sz="900" dirty="0" smtClean="0"/>
+              <a:t>     or</a:t>
+            </a:r>
+            <a:br>
+              <a:rPr lang="en-GB" sz="900" dirty="0" smtClean="0"/>
+            </a:br>
+            <a:r>
+              <a:rPr lang="en-GB" sz="1200" dirty="0" smtClean="0"/>
+              <a:t>with custom persistence</a:t>
+            </a:r>
+          </a:p>
+        </p:txBody>
+      </p:sp>
+      <p:sp>
+        <p:nvSpPr>
+          <p:cNvPr id="18" name="TextBox 17"/>
+          <p:cNvSpPr txBox="1"/>
+          <p:nvPr/>
+        </p:nvSpPr>
+        <p:spPr>
+          <a:xfrm>
+            <a:off x="5703286" y="188640"/>
+            <a:ext cx="1696683" cy="461665"/>
+          </a:xfrm>
+          <a:prstGeom prst="rect">
+            <a:avLst/>
+          </a:prstGeom>
+          <a:noFill/>
+        </p:spPr>
+        <p:txBody>
+          <a:bodyPr wrap="none" rtlCol="0">
+            <a:spAutoFit/>
+          </a:bodyPr>
+          <a:lstStyle/>
+          <a:p>
+            <a:r>
+              <a:rPr lang="en-GB" sz="1200" dirty="0" smtClean="0"/>
+              <a:t>with custom UI</a:t>
+            </a:r>
+            <a:br>
+              <a:rPr lang="en-GB" sz="1200" dirty="0" smtClean="0"/>
+            </a:br>
+            <a:r>
+              <a:rPr lang="en-GB" sz="1200" dirty="0" smtClean="0"/>
+              <a:t> and custom persistence</a:t>
+            </a:r>
+          </a:p>
+        </p:txBody>
+      </p:sp>
+      <p:sp>
+        <p:nvSpPr>
+          <p:cNvPr id="19" name="TextBox 18"/>
+          <p:cNvSpPr txBox="1"/>
+          <p:nvPr/>
+        </p:nvSpPr>
+        <p:spPr>
+          <a:xfrm>
+            <a:off x="2343295" y="1772816"/>
+            <a:ext cx="1218988" cy="461665"/>
+          </a:xfrm>
+          <a:prstGeom prst="rect">
+            <a:avLst/>
+          </a:prstGeom>
+          <a:noFill/>
+        </p:spPr>
+        <p:txBody>
+          <a:bodyPr wrap="none" rtlCol="0">
+            <a:spAutoFit/>
+          </a:bodyPr>
+          <a:lstStyle/>
+          <a:p>
+            <a:pPr algn="ctr"/>
+            <a:r>
+              <a:rPr lang="en-GB" sz="1200" dirty="0" err="1" smtClean="0"/>
+              <a:t>JUnit</a:t>
+            </a:r>
+            <a:r>
+              <a:rPr lang="en-GB" sz="1200" dirty="0" smtClean="0"/>
+              <a:t> integration</a:t>
+            </a:r>
+          </a:p>
+          <a:p>
+            <a:pPr algn="ctr"/>
+            <a:r>
+              <a:rPr lang="en-GB" sz="1200" dirty="0" smtClean="0"/>
+              <a:t>BDD integration</a:t>
+            </a:r>
+          </a:p>
+        </p:txBody>
+      </p:sp>
+      <p:sp>
+        <p:nvSpPr>
+          <p:cNvPr id="22" name="TextBox 21"/>
+          <p:cNvSpPr txBox="1"/>
+          <p:nvPr/>
+        </p:nvSpPr>
+        <p:spPr>
+          <a:xfrm>
+            <a:off x="35496" y="1772816"/>
+            <a:ext cx="1690463" cy="625812"/>
+          </a:xfrm>
+          <a:prstGeom prst="rect">
+            <a:avLst/>
+          </a:prstGeom>
+          <a:noFill/>
+        </p:spPr>
+        <p:txBody>
+          <a:bodyPr wrap="none" rtlCol="0">
+            <a:spAutoFit/>
+          </a:bodyPr>
+          <a:lstStyle/>
+          <a:p>
+            <a:pPr algn="ctr"/>
+            <a:r>
+              <a:rPr lang="en-GB" sz="1200" dirty="0" err="1" smtClean="0"/>
+              <a:t>Isis’programming</a:t>
+            </a:r>
+            <a:r>
+              <a:rPr lang="en-GB" sz="1200" dirty="0" smtClean="0"/>
+              <a:t> model</a:t>
+            </a:r>
+          </a:p>
+          <a:p>
+            <a:pPr algn="ctr">
+              <a:spcBef>
+                <a:spcPts val="200"/>
+              </a:spcBef>
+            </a:pPr>
+            <a:r>
+              <a:rPr lang="en-GB" sz="900" dirty="0" smtClean="0"/>
+              <a:t>and optionally</a:t>
+            </a:r>
+          </a:p>
+          <a:p>
+            <a:pPr algn="ctr"/>
+            <a:r>
+              <a:rPr lang="en-GB" sz="1200" dirty="0" smtClean="0"/>
+              <a:t>custom extensions</a:t>
+            </a:r>
           </a:p>
         </p:txBody>
       </p:sp>

</xml_diff>